<commit_message>
Update Sizing to include gb/day for charts
Added GB/day to sizing guide to make it clear what the numbers represented.
</commit_message>
<xml_diff>
--- a/11 - Sizing AWS Environment.pptx
+++ b/11 - Sizing AWS Environment.pptx
@@ -671,7 +671,7 @@
             </a:pPr>
             <a:r>
               <a:rPr lang="en-US" dirty="0"/>
-              <a:t>Growth of Data collected from AWS</a:t>
+              <a:t>Growth of Data collected from AWS in GB/day</a:t>
             </a:r>
           </a:p>
         </c:rich>
@@ -9371,7 +9371,7 @@
               <a:pPr>
                 <a:defRPr/>
               </a:pPr>
-              <a:t>8/3/18</a:t>
+              <a:t>1/17/19</a:t>
             </a:fld>
             <a:endParaRPr lang="en-US"/>
           </a:p>
@@ -9595,7 +9595,7 @@
               <a:pPr>
                 <a:defRPr/>
               </a:pPr>
-              <a:t>8/3/18</a:t>
+              <a:t>1/17/19</a:t>
             </a:fld>
             <a:endParaRPr lang="en-US"/>
           </a:p>
@@ -28967,14 +28967,14 @@
           </a:ln>
           <a:extLst>
             <a:ext uri="{909E8E84-426E-40dd-AFC4-6F175D3DCCD1}">
-              <a14:hiddenFill xmlns="" xmlns:a14="http://schemas.microsoft.com/office/drawing/2010/main">
+              <a14:hiddenFill xmlns:a14="http://schemas.microsoft.com/office/drawing/2010/main" xmlns="">
                 <a:solidFill>
                   <a:srgbClr val="FFFFFF"/>
                 </a:solidFill>
               </a14:hiddenFill>
             </a:ext>
             <a:ext uri="{91240B29-F687-4f45-9708-019B960494DF}">
-              <a14:hiddenLine xmlns="" xmlns:a14="http://schemas.microsoft.com/office/drawing/2010/main" w="9525">
+              <a14:hiddenLine xmlns:a14="http://schemas.microsoft.com/office/drawing/2010/main" xmlns="" w="9525">
                 <a:solidFill>
                   <a:srgbClr val="000000"/>
                 </a:solidFill>
@@ -29008,14 +29008,14 @@
           </a:ln>
           <a:extLst>
             <a:ext uri="{909E8E84-426E-40dd-AFC4-6F175D3DCCD1}">
-              <a14:hiddenFill xmlns="" xmlns:a14="http://schemas.microsoft.com/office/drawing/2010/main">
+              <a14:hiddenFill xmlns:a14="http://schemas.microsoft.com/office/drawing/2010/main" xmlns="">
                 <a:solidFill>
                   <a:srgbClr val="FFFFFF"/>
                 </a:solidFill>
               </a14:hiddenFill>
             </a:ext>
             <a:ext uri="{91240B29-F687-4f45-9708-019B960494DF}">
-              <a14:hiddenLine xmlns="" xmlns:a14="http://schemas.microsoft.com/office/drawing/2010/main" w="9525">
+              <a14:hiddenLine xmlns:a14="http://schemas.microsoft.com/office/drawing/2010/main" xmlns="" w="9525">
                 <a:solidFill>
                   <a:srgbClr val="000000"/>
                 </a:solidFill>
@@ -29178,14 +29178,14 @@
           </a:ln>
           <a:extLst>
             <a:ext uri="{909E8E84-426E-40dd-AFC4-6F175D3DCCD1}">
-              <a14:hiddenFill xmlns="" xmlns:a14="http://schemas.microsoft.com/office/drawing/2010/main">
+              <a14:hiddenFill xmlns:a14="http://schemas.microsoft.com/office/drawing/2010/main" xmlns="">
                 <a:solidFill>
                   <a:srgbClr val="FFFFFF"/>
                 </a:solidFill>
               </a14:hiddenFill>
             </a:ext>
             <a:ext uri="{91240B29-F687-4f45-9708-019B960494DF}">
-              <a14:hiddenLine xmlns="" xmlns:a14="http://schemas.microsoft.com/office/drawing/2010/main" w="9525">
+              <a14:hiddenLine xmlns:a14="http://schemas.microsoft.com/office/drawing/2010/main" xmlns="" w="9525">
                 <a:solidFill>
                   <a:srgbClr val="000000"/>
                 </a:solidFill>
@@ -29232,14 +29232,14 @@
           </a:ln>
           <a:extLst>
             <a:ext uri="{909E8E84-426E-40dd-AFC4-6F175D3DCCD1}">
-              <a14:hiddenFill xmlns="" xmlns:a14="http://schemas.microsoft.com/office/drawing/2010/main">
+              <a14:hiddenFill xmlns:a14="http://schemas.microsoft.com/office/drawing/2010/main" xmlns="">
                 <a:solidFill>
                   <a:srgbClr val="FFFFFF"/>
                 </a:solidFill>
               </a14:hiddenFill>
             </a:ext>
             <a:ext uri="{91240B29-F687-4f45-9708-019B960494DF}">
-              <a14:hiddenLine xmlns="" xmlns:a14="http://schemas.microsoft.com/office/drawing/2010/main" w="9525">
+              <a14:hiddenLine xmlns:a14="http://schemas.microsoft.com/office/drawing/2010/main" xmlns="" w="9525">
                 <a:solidFill>
                   <a:srgbClr val="000000"/>
                 </a:solidFill>
@@ -29273,14 +29273,14 @@
           </a:ln>
           <a:extLst>
             <a:ext uri="{909E8E84-426E-40dd-AFC4-6F175D3DCCD1}">
-              <a14:hiddenFill xmlns="" xmlns:a14="http://schemas.microsoft.com/office/drawing/2010/main">
+              <a14:hiddenFill xmlns:a14="http://schemas.microsoft.com/office/drawing/2010/main" xmlns="">
                 <a:solidFill>
                   <a:srgbClr val="FFFFFF"/>
                 </a:solidFill>
               </a14:hiddenFill>
             </a:ext>
             <a:ext uri="{91240B29-F687-4f45-9708-019B960494DF}">
-              <a14:hiddenLine xmlns="" xmlns:a14="http://schemas.microsoft.com/office/drawing/2010/main" w="9525">
+              <a14:hiddenLine xmlns:a14="http://schemas.microsoft.com/office/drawing/2010/main" xmlns="" w="9525">
                 <a:solidFill>
                   <a:srgbClr val="000000"/>
                 </a:solidFill>
@@ -29443,14 +29443,14 @@
           </a:ln>
           <a:extLst>
             <a:ext uri="{909E8E84-426E-40dd-AFC4-6F175D3DCCD1}">
-              <a14:hiddenFill xmlns="" xmlns:a14="http://schemas.microsoft.com/office/drawing/2010/main">
+              <a14:hiddenFill xmlns:a14="http://schemas.microsoft.com/office/drawing/2010/main" xmlns="">
                 <a:solidFill>
                   <a:srgbClr val="FFFFFF"/>
                 </a:solidFill>
               </a14:hiddenFill>
             </a:ext>
             <a:ext uri="{91240B29-F687-4f45-9708-019B960494DF}">
-              <a14:hiddenLine xmlns="" xmlns:a14="http://schemas.microsoft.com/office/drawing/2010/main" w="9525">
+              <a14:hiddenLine xmlns:a14="http://schemas.microsoft.com/office/drawing/2010/main" xmlns="" w="9525">
                 <a:solidFill>
                   <a:srgbClr val="000000"/>
                 </a:solidFill>
@@ -34880,14 +34880,14 @@
           </a:ln>
           <a:extLst>
             <a:ext uri="{909E8E84-426E-40dd-AFC4-6F175D3DCCD1}">
-              <a14:hiddenFill xmlns="" xmlns:a14="http://schemas.microsoft.com/office/drawing/2010/main">
+              <a14:hiddenFill xmlns:a14="http://schemas.microsoft.com/office/drawing/2010/main" xmlns="">
                 <a:solidFill>
                   <a:srgbClr val="FFFFFF"/>
                 </a:solidFill>
               </a14:hiddenFill>
             </a:ext>
             <a:ext uri="{91240B29-F687-4f45-9708-019B960494DF}">
-              <a14:hiddenLine xmlns="" xmlns:a14="http://schemas.microsoft.com/office/drawing/2010/main" w="9525">
+              <a14:hiddenLine xmlns:a14="http://schemas.microsoft.com/office/drawing/2010/main" xmlns="" w="9525">
                 <a:solidFill>
                   <a:srgbClr val="000000"/>
                 </a:solidFill>
@@ -34921,14 +34921,14 @@
           </a:ln>
           <a:extLst>
             <a:ext uri="{909E8E84-426E-40dd-AFC4-6F175D3DCCD1}">
-              <a14:hiddenFill xmlns="" xmlns:a14="http://schemas.microsoft.com/office/drawing/2010/main">
+              <a14:hiddenFill xmlns:a14="http://schemas.microsoft.com/office/drawing/2010/main" xmlns="">
                 <a:solidFill>
                   <a:srgbClr val="FFFFFF"/>
                 </a:solidFill>
               </a14:hiddenFill>
             </a:ext>
             <a:ext uri="{91240B29-F687-4f45-9708-019B960494DF}">
-              <a14:hiddenLine xmlns="" xmlns:a14="http://schemas.microsoft.com/office/drawing/2010/main" w="9525">
+              <a14:hiddenLine xmlns:a14="http://schemas.microsoft.com/office/drawing/2010/main" xmlns="" w="9525">
                 <a:solidFill>
                   <a:srgbClr val="000000"/>
                 </a:solidFill>
@@ -35091,14 +35091,14 @@
           </a:ln>
           <a:extLst>
             <a:ext uri="{909E8E84-426E-40dd-AFC4-6F175D3DCCD1}">
-              <a14:hiddenFill xmlns="" xmlns:a14="http://schemas.microsoft.com/office/drawing/2010/main">
+              <a14:hiddenFill xmlns:a14="http://schemas.microsoft.com/office/drawing/2010/main" xmlns="">
                 <a:solidFill>
                   <a:srgbClr val="FFFFFF"/>
                 </a:solidFill>
               </a14:hiddenFill>
             </a:ext>
             <a:ext uri="{91240B29-F687-4f45-9708-019B960494DF}">
-              <a14:hiddenLine xmlns="" xmlns:a14="http://schemas.microsoft.com/office/drawing/2010/main" w="9525">
+              <a14:hiddenLine xmlns:a14="http://schemas.microsoft.com/office/drawing/2010/main" xmlns="" w="9525">
                 <a:solidFill>
                   <a:srgbClr val="000000"/>
                 </a:solidFill>
@@ -39676,7 +39676,7 @@
           <p:nvPr>
             <p:extLst>
               <p:ext uri="{D42A27DB-BD31-4B8C-83A1-F6EECF244321}">
-                <p14:modId xmlns:p14="http://schemas.microsoft.com/office/powerpoint/2010/main" val="925034492"/>
+                <p14:modId xmlns:p14="http://schemas.microsoft.com/office/powerpoint/2010/main" val="417752586"/>
               </p:ext>
             </p:extLst>
           </p:nvPr>
@@ -39989,6 +39989,41 @@
           </a:graphicData>
         </a:graphic>
       </p:graphicFrame>
+      <p:sp>
+        <p:nvSpPr>
+          <p:cNvPr id="2" name="TextBox 1">
+            <a:extLst>
+              <a:ext uri="{FF2B5EF4-FFF2-40B4-BE49-F238E27FC236}">
+                <a16:creationId xmlns:a16="http://schemas.microsoft.com/office/drawing/2014/main" id="{E44AA8AE-FBB8-DC46-ADEC-69A347C84299}"/>
+              </a:ext>
+            </a:extLst>
+          </p:cNvPr>
+          <p:cNvSpPr txBox="1"/>
+          <p:nvPr/>
+        </p:nvSpPr>
+        <p:spPr>
+          <a:xfrm>
+            <a:off x="342047" y="2202418"/>
+            <a:ext cx="922432" cy="369332"/>
+          </a:xfrm>
+          <a:prstGeom prst="rect">
+            <a:avLst/>
+          </a:prstGeom>
+          <a:noFill/>
+        </p:spPr>
+        <p:txBody>
+          <a:bodyPr wrap="none" lIns="0" tIns="0" rIns="0" bIns="0" rtlCol="0">
+            <a:spAutoFit/>
+          </a:bodyPr>
+          <a:lstStyle/>
+          <a:p>
+            <a:r>
+              <a:rPr lang="en-US" sz="2400" dirty="0"/>
+              <a:t>GB/day</a:t>
+            </a:r>
+          </a:p>
+        </p:txBody>
+      </p:sp>
     </p:spTree>
     <p:extLst>
       <p:ext uri="{BB962C8B-B14F-4D97-AF65-F5344CB8AC3E}">

</xml_diff>